<commit_message>
finished the draft of the xaringan presentation
</commit_message>
<xml_diff>
--- a/presentation/oralpresentation.pptx
+++ b/presentation/oralpresentation.pptx
@@ -11116,8 +11116,8 @@
         </p:nvSpPr>
         <p:spPr>
           <a:xfrm>
-            <a:off x="712550" y="273646"/>
-            <a:ext cx="3241190" cy="997403"/>
+            <a:off x="620486" y="230027"/>
+            <a:ext cx="4196801" cy="1084637"/>
           </a:xfrm>
           <a:prstGeom prst="homePlate">
             <a:avLst/>
@@ -11174,7 +11174,7 @@
         <p:spPr>
           <a:xfrm>
             <a:off x="738596" y="109565"/>
-            <a:ext cx="3049385" cy="1325563"/>
+            <a:ext cx="3061047" cy="1325563"/>
           </a:xfrm>
           <a:prstGeom prst="rect">
             <a:avLst/>
@@ -12082,6 +12082,61 @@
       </p:grpSpPr>
       <p:sp>
         <p:nvSpPr>
+          <p:cNvPr id="7" name="Arrow: Pentagon 6">
+            <a:extLst>
+              <a:ext uri="{FF2B5EF4-FFF2-40B4-BE49-F238E27FC236}">
+                <a16:creationId xmlns:a16="http://schemas.microsoft.com/office/drawing/2014/main" id="{2F39BCA2-DBF4-454E-94A5-ECBE494051D7}"/>
+              </a:ext>
+            </a:extLst>
+          </p:cNvPr>
+          <p:cNvSpPr/>
+          <p:nvPr/>
+        </p:nvSpPr>
+        <p:spPr>
+          <a:xfrm>
+            <a:off x="718141" y="365124"/>
+            <a:ext cx="4253354" cy="1259489"/>
+          </a:xfrm>
+          <a:prstGeom prst="homePlate">
+            <a:avLst/>
+          </a:prstGeom>
+          <a:solidFill>
+            <a:schemeClr val="tx1">
+              <a:lumMod val="75000"/>
+              <a:lumOff val="25000"/>
+            </a:schemeClr>
+          </a:solidFill>
+          <a:ln>
+            <a:noFill/>
+          </a:ln>
+        </p:spPr>
+        <p:style>
+          <a:lnRef idx="2">
+            <a:schemeClr val="dk1">
+              <a:shade val="50000"/>
+            </a:schemeClr>
+          </a:lnRef>
+          <a:fillRef idx="1">
+            <a:schemeClr val="dk1"/>
+          </a:fillRef>
+          <a:effectRef idx="0">
+            <a:schemeClr val="dk1"/>
+          </a:effectRef>
+          <a:fontRef idx="minor">
+            <a:schemeClr val="lt1"/>
+          </a:fontRef>
+        </p:style>
+        <p:txBody>
+          <a:bodyPr rtlCol="0" anchor="ctr"/>
+          <a:lstStyle/>
+          <a:p>
+            <a:pPr algn="ctr"/>
+            <a:endParaRPr lang="en-US"/>
+          </a:p>
+        </p:txBody>
+      </p:sp>
+      <p:sp>
+        <p:nvSpPr>
           <p:cNvPr id="2" name="Title 1">
             <a:extLst>
               <a:ext uri="{FF2B5EF4-FFF2-40B4-BE49-F238E27FC236}">
@@ -12096,71 +12151,57 @@
             <p:ph type="title"/>
           </p:nvPr>
         </p:nvSpPr>
-        <p:spPr/>
+        <p:spPr>
+          <a:xfrm>
+            <a:off x="838200" y="365125"/>
+            <a:ext cx="3272161" cy="1325563"/>
+          </a:xfrm>
+        </p:spPr>
         <p:txBody>
           <a:bodyPr/>
           <a:lstStyle/>
           <a:p>
             <a:r>
-              <a:rPr lang="en-US" dirty="0"/>
+              <a:rPr lang="en-US" dirty="0">
+                <a:solidFill>
+                  <a:schemeClr val="bg1"/>
+                </a:solidFill>
+              </a:rPr>
               <a:t>Class Variable</a:t>
             </a:r>
           </a:p>
         </p:txBody>
       </p:sp>
-      <p:sp>
-        <p:nvSpPr>
-          <p:cNvPr id="3" name="Content Placeholder 2">
+      <p:pic>
+        <p:nvPicPr>
+          <p:cNvPr id="9" name="Picture 8">
             <a:extLst>
               <a:ext uri="{FF2B5EF4-FFF2-40B4-BE49-F238E27FC236}">
-                <a16:creationId xmlns:a16="http://schemas.microsoft.com/office/drawing/2014/main" id="{3267B0C2-59B0-4815-94F7-2BD62E8D9368}"/>
+                <a16:creationId xmlns:a16="http://schemas.microsoft.com/office/drawing/2014/main" id="{D1527C6E-DA3A-4F1B-9942-7FD8B65F8063}"/>
               </a:ext>
             </a:extLst>
           </p:cNvPr>
-          <p:cNvSpPr>
-            <a:spLocks noGrp="1"/>
-          </p:cNvSpPr>
-          <p:nvPr>
-            <p:ph idx="1"/>
-          </p:nvPr>
-        </p:nvSpPr>
-        <p:spPr/>
-        <p:txBody>
-          <a:bodyPr/>
-          <a:lstStyle/>
-          <a:p>
-            <a:r>
-              <a:rPr lang="en-US" dirty="0"/>
-              <a:t>Rate of violent crime in an area</a:t>
-            </a:r>
-          </a:p>
-          <a:p>
-            <a:r>
-              <a:rPr lang="en-US" dirty="0"/>
-              <a:t>Code: </a:t>
-            </a:r>
-            <a:r>
-              <a:rPr lang="en-US" dirty="0" err="1"/>
-              <a:t>violentCrimeForCommunityArea</a:t>
-            </a:r>
-            <a:r>
-              <a:rPr lang="en-US" dirty="0"/>
-              <a:t> * 1000 / </a:t>
-            </a:r>
-            <a:r>
-              <a:rPr lang="en-US" dirty="0" err="1"/>
-              <a:t>populationOfCommunityArea</a:t>
-            </a:r>
-            <a:endParaRPr lang="en-US" dirty="0"/>
-          </a:p>
-          <a:p>
-            <a:endParaRPr lang="en-US" dirty="0"/>
-          </a:p>
-          <a:p>
-            <a:endParaRPr lang="en-US" dirty="0"/>
-          </a:p>
-        </p:txBody>
-      </p:sp>
+          <p:cNvPicPr>
+            <a:picLocks noChangeAspect="1"/>
+          </p:cNvPicPr>
+          <p:nvPr/>
+        </p:nvPicPr>
+        <p:blipFill>
+          <a:blip r:embed="rId3"/>
+          <a:stretch>
+            <a:fillRect/>
+          </a:stretch>
+        </p:blipFill>
+        <p:spPr>
+          <a:xfrm>
+            <a:off x="303320" y="2801653"/>
+            <a:ext cx="11585359" cy="2160215"/>
+          </a:xfrm>
+          <a:prstGeom prst="rect">
+            <a:avLst/>
+          </a:prstGeom>
+        </p:spPr>
+      </p:pic>
     </p:spTree>
     <p:extLst>
       <p:ext uri="{BB962C8B-B14F-4D97-AF65-F5344CB8AC3E}">

</xml_diff>

<commit_message>
almost done report, finished draft of oral presentation
</commit_message>
<xml_diff>
--- a/presentation/oralpresentation.pptx
+++ b/presentation/oralpresentation.pptx
@@ -5,7 +5,7 @@
     <p:sldMasterId id="2147483648" r:id="rId1"/>
   </p:sldMasterIdLst>
   <p:notesMasterIdLst>
-    <p:notesMasterId r:id="rId17"/>
+    <p:notesMasterId r:id="rId18"/>
   </p:notesMasterIdLst>
   <p:sldIdLst>
     <p:sldId id="256" r:id="rId2"/>
@@ -23,6 +23,7 @@
     <p:sldId id="261" r:id="rId14"/>
     <p:sldId id="266" r:id="rId15"/>
     <p:sldId id="262" r:id="rId16"/>
+    <p:sldId id="272" r:id="rId17"/>
   </p:sldIdLst>
   <p:sldSz cx="12192000" cy="6858000"/>
   <p:notesSz cx="6858000" cy="9144000"/>
@@ -5042,6 +5043,90 @@
 </p:notes>
 </file>
 
+<file path=ppt/notesSlides/notesSlide8.xml><?xml version="1.0" encoding="utf-8"?>
+<p:notes xmlns:a="http://schemas.openxmlformats.org/drawingml/2006/main" xmlns:r="http://schemas.openxmlformats.org/officeDocument/2006/relationships" xmlns:p="http://schemas.openxmlformats.org/presentationml/2006/main">
+  <p:cSld>
+    <p:spTree>
+      <p:nvGrpSpPr>
+        <p:cNvPr id="1" name=""/>
+        <p:cNvGrpSpPr/>
+        <p:nvPr/>
+      </p:nvGrpSpPr>
+      <p:grpSpPr>
+        <a:xfrm>
+          <a:off x="0" y="0"/>
+          <a:ext cx="0" cy="0"/>
+          <a:chOff x="0" y="0"/>
+          <a:chExt cx="0" cy="0"/>
+        </a:xfrm>
+      </p:grpSpPr>
+      <p:sp>
+        <p:nvSpPr>
+          <p:cNvPr id="2" name="Slide Image Placeholder 1"/>
+          <p:cNvSpPr>
+            <a:spLocks noGrp="1" noRot="1" noChangeAspect="1"/>
+          </p:cNvSpPr>
+          <p:nvPr>
+            <p:ph type="sldImg"/>
+          </p:nvPr>
+        </p:nvSpPr>
+        <p:spPr/>
+      </p:sp>
+      <p:sp>
+        <p:nvSpPr>
+          <p:cNvPr id="3" name="Notes Placeholder 2"/>
+          <p:cNvSpPr>
+            <a:spLocks noGrp="1"/>
+          </p:cNvSpPr>
+          <p:nvPr>
+            <p:ph type="body" idx="1"/>
+          </p:nvPr>
+        </p:nvSpPr>
+        <p:spPr/>
+        <p:txBody>
+          <a:bodyPr/>
+          <a:lstStyle/>
+          <a:p>
+            <a:endParaRPr lang="en-US" dirty="0"/>
+          </a:p>
+        </p:txBody>
+      </p:sp>
+      <p:sp>
+        <p:nvSpPr>
+          <p:cNvPr id="4" name="Slide Number Placeholder 3"/>
+          <p:cNvSpPr>
+            <a:spLocks noGrp="1"/>
+          </p:cNvSpPr>
+          <p:nvPr>
+            <p:ph type="sldNum" sz="quarter" idx="10"/>
+          </p:nvPr>
+        </p:nvSpPr>
+        <p:spPr/>
+        <p:txBody>
+          <a:bodyPr/>
+          <a:lstStyle/>
+          <a:p>
+            <a:fld id="{E0865CCC-22B7-4BA3-9105-7042E1A6B194}" type="slidenum">
+              <a:rPr lang="en-US" smtClean="0"/>
+              <a:t>16</a:t>
+            </a:fld>
+            <a:endParaRPr lang="en-US"/>
+          </a:p>
+        </p:txBody>
+      </p:sp>
+    </p:spTree>
+    <p:extLst>
+      <p:ext uri="{BB962C8B-B14F-4D97-AF65-F5344CB8AC3E}">
+        <p14:creationId xmlns:p14="http://schemas.microsoft.com/office/powerpoint/2010/main" val="55330715"/>
+      </p:ext>
+    </p:extLst>
+  </p:cSld>
+  <p:clrMapOvr>
+    <a:masterClrMapping/>
+  </p:clrMapOvr>
+</p:notes>
+</file>
+
 <file path=ppt/slideLayouts/slideLayout1.xml><?xml version="1.0" encoding="utf-8"?>
 <p:sldLayout xmlns:a="http://schemas.openxmlformats.org/drawingml/2006/main" xmlns:r="http://schemas.openxmlformats.org/officeDocument/2006/relationships" xmlns:p="http://schemas.openxmlformats.org/presentationml/2006/main" type="title" preserve="1">
   <p:cSld name="Title Slide">
@@ -11011,6 +11096,275 @@
 </p:sld>
 </file>
 
+<file path=ppt/slides/slide16.xml><?xml version="1.0" encoding="utf-8"?>
+<p:sld xmlns:a="http://schemas.openxmlformats.org/drawingml/2006/main" xmlns:r="http://schemas.openxmlformats.org/officeDocument/2006/relationships" xmlns:p="http://schemas.openxmlformats.org/presentationml/2006/main">
+  <p:cSld>
+    <p:bg>
+      <p:bgPr>
+        <a:solidFill>
+          <a:schemeClr val="tx1"/>
+        </a:solidFill>
+        <a:effectLst/>
+      </p:bgPr>
+    </p:bg>
+    <p:spTree>
+      <p:nvGrpSpPr>
+        <p:cNvPr id="1" name=""/>
+        <p:cNvGrpSpPr/>
+        <p:nvPr/>
+      </p:nvGrpSpPr>
+      <p:grpSpPr>
+        <a:xfrm>
+          <a:off x="0" y="0"/>
+          <a:ext cx="0" cy="0"/>
+          <a:chOff x="0" y="0"/>
+          <a:chExt cx="0" cy="0"/>
+        </a:xfrm>
+      </p:grpSpPr>
+      <p:sp>
+        <p:nvSpPr>
+          <p:cNvPr id="14" name="Rectangle 13">
+            <a:extLst>
+              <a:ext uri="{FF2B5EF4-FFF2-40B4-BE49-F238E27FC236}">
+                <a16:creationId xmlns:a16="http://schemas.microsoft.com/office/drawing/2014/main" id="{2A8AA5BC-4F7A-4226-8F99-6D824B226A97}"/>
+              </a:ext>
+              <a:ext uri="{C183D7F6-B498-43B3-948B-1728B52AA6E4}">
+                <adec:decorative xmlns:adec="http://schemas.microsoft.com/office/drawing/2017/decorative" val="1"/>
+              </a:ext>
+            </a:extLst>
+          </p:cNvPr>
+          <p:cNvSpPr>
+            <a:spLocks noGrp="1" noRot="1" noChangeAspect="1" noMove="1" noResize="1" noEditPoints="1" noAdjustHandles="1" noChangeArrowheads="1" noChangeShapeType="1" noTextEdit="1"/>
+          </p:cNvSpPr>
+          <p:nvPr>
+            <p:extLst>
+              <p:ext uri="{386F3935-93C4-4BCD-93E2-E3B085C9AB24}">
+                <p16:designElem xmlns:p16="http://schemas.microsoft.com/office/powerpoint/2015/main" val="1"/>
+              </p:ext>
+            </p:extLst>
+          </p:nvPr>
+        </p:nvSpPr>
+        <p:spPr>
+          <a:xfrm>
+            <a:off x="0" y="-3324"/>
+            <a:ext cx="12192000" cy="6861324"/>
+          </a:xfrm>
+          <a:prstGeom prst="rect">
+            <a:avLst/>
+          </a:prstGeom>
+          <a:solidFill>
+            <a:schemeClr val="tx1"/>
+          </a:solidFill>
+          <a:ln>
+            <a:noFill/>
+          </a:ln>
+        </p:spPr>
+        <p:style>
+          <a:lnRef idx="2">
+            <a:schemeClr val="accent1">
+              <a:shade val="50000"/>
+            </a:schemeClr>
+          </a:lnRef>
+          <a:fillRef idx="1">
+            <a:schemeClr val="accent1"/>
+          </a:fillRef>
+          <a:effectRef idx="0">
+            <a:schemeClr val="accent1"/>
+          </a:effectRef>
+          <a:fontRef idx="minor">
+            <a:schemeClr val="lt1"/>
+          </a:fontRef>
+        </p:style>
+        <p:txBody>
+          <a:bodyPr rtlCol="0" anchor="ctr"/>
+          <a:lstStyle/>
+          <a:p>
+            <a:pPr algn="ctr"/>
+            <a:endParaRPr lang="en-US"/>
+          </a:p>
+        </p:txBody>
+      </p:sp>
+      <p:sp>
+        <p:nvSpPr>
+          <p:cNvPr id="16" name="Rectangle 15">
+            <a:extLst>
+              <a:ext uri="{FF2B5EF4-FFF2-40B4-BE49-F238E27FC236}">
+                <a16:creationId xmlns:a16="http://schemas.microsoft.com/office/drawing/2014/main" id="{3E5445C6-DD42-4979-86FF-03730E8C6DB0}"/>
+              </a:ext>
+              <a:ext uri="{C183D7F6-B498-43B3-948B-1728B52AA6E4}">
+                <adec:decorative xmlns:adec="http://schemas.microsoft.com/office/drawing/2017/decorative" val="1"/>
+              </a:ext>
+            </a:extLst>
+          </p:cNvPr>
+          <p:cNvSpPr>
+            <a:spLocks noGrp="1" noRot="1" noChangeAspect="1" noMove="1" noResize="1" noEditPoints="1" noAdjustHandles="1" noChangeArrowheads="1" noChangeShapeType="1" noTextEdit="1"/>
+          </p:cNvSpPr>
+          <p:nvPr>
+            <p:extLst>
+              <p:ext uri="{386F3935-93C4-4BCD-93E2-E3B085C9AB24}">
+                <p16:designElem xmlns:p16="http://schemas.microsoft.com/office/powerpoint/2015/main" val="1"/>
+              </p:ext>
+            </p:extLst>
+          </p:nvPr>
+        </p:nvSpPr>
+        <p:spPr bwMode="ltGray">
+          <a:xfrm>
+            <a:off x="321734" y="321733"/>
+            <a:ext cx="11573488" cy="6214534"/>
+          </a:xfrm>
+          <a:prstGeom prst="rect">
+            <a:avLst/>
+          </a:prstGeom>
+          <a:solidFill>
+            <a:schemeClr val="bg1">
+              <a:lumMod val="75000"/>
+              <a:lumOff val="25000"/>
+            </a:schemeClr>
+          </a:solidFill>
+          <a:ln w="127000" cap="sq" cmpd="thinThick">
+            <a:solidFill>
+              <a:schemeClr val="bg1">
+                <a:lumMod val="75000"/>
+                <a:lumOff val="25000"/>
+              </a:schemeClr>
+            </a:solidFill>
+          </a:ln>
+        </p:spPr>
+        <p:style>
+          <a:lnRef idx="2">
+            <a:schemeClr val="accent1">
+              <a:shade val="50000"/>
+            </a:schemeClr>
+          </a:lnRef>
+          <a:fillRef idx="1">
+            <a:schemeClr val="accent1"/>
+          </a:fillRef>
+          <a:effectRef idx="0">
+            <a:schemeClr val="accent1"/>
+          </a:effectRef>
+          <a:fontRef idx="minor">
+            <a:schemeClr val="lt1"/>
+          </a:fontRef>
+        </p:style>
+        <p:txBody>
+          <a:bodyPr rtlCol="0" anchor="ctr"/>
+          <a:lstStyle/>
+          <a:p>
+            <a:pPr algn="ctr"/>
+            <a:endParaRPr lang="en-US"/>
+          </a:p>
+        </p:txBody>
+      </p:sp>
+      <p:sp>
+        <p:nvSpPr>
+          <p:cNvPr id="2" name="Title 1">
+            <a:extLst>
+              <a:ext uri="{FF2B5EF4-FFF2-40B4-BE49-F238E27FC236}">
+                <a16:creationId xmlns:a16="http://schemas.microsoft.com/office/drawing/2014/main" id="{FC1AE099-F349-4769-A760-509B3AB8836F}"/>
+              </a:ext>
+            </a:extLst>
+          </p:cNvPr>
+          <p:cNvSpPr>
+            <a:spLocks noGrp="1"/>
+          </p:cNvSpPr>
+          <p:nvPr>
+            <p:ph type="title"/>
+          </p:nvPr>
+        </p:nvSpPr>
+        <p:spPr>
+          <a:xfrm>
+            <a:off x="1524000" y="1122362"/>
+            <a:ext cx="9144000" cy="2840037"/>
+          </a:xfrm>
+        </p:spPr>
+        <p:txBody>
+          <a:bodyPr vert="horz" lIns="91440" tIns="45720" rIns="91440" bIns="45720" rtlCol="0" anchor="b">
+            <a:normAutofit/>
+          </a:bodyPr>
+          <a:lstStyle/>
+          <a:p>
+            <a:pPr algn="ctr"/>
+            <a:r>
+              <a:rPr lang="en-US" sz="5800" kern="1200" dirty="0">
+                <a:solidFill>
+                  <a:schemeClr val="tx1"/>
+                </a:solidFill>
+                <a:latin typeface="+mj-lt"/>
+                <a:ea typeface="+mj-ea"/>
+                <a:cs typeface="+mj-cs"/>
+              </a:rPr>
+              <a:t>Thank You For Listening</a:t>
+            </a:r>
+          </a:p>
+        </p:txBody>
+      </p:sp>
+      <p:cxnSp>
+        <p:nvCxnSpPr>
+          <p:cNvPr id="18" name="Straight Connector 17">
+            <a:extLst>
+              <a:ext uri="{FF2B5EF4-FFF2-40B4-BE49-F238E27FC236}">
+                <a16:creationId xmlns:a16="http://schemas.microsoft.com/office/drawing/2014/main" id="{45000665-DFC7-417E-8FD7-516A0F15C975}"/>
+              </a:ext>
+              <a:ext uri="{C183D7F6-B498-43B3-948B-1728B52AA6E4}">
+                <adec:decorative xmlns:adec="http://schemas.microsoft.com/office/drawing/2017/decorative" val="1"/>
+              </a:ext>
+            </a:extLst>
+          </p:cNvPr>
+          <p:cNvCxnSpPr>
+            <a:cxnSpLocks noGrp="1" noRot="1" noChangeAspect="1" noMove="1" noResize="1" noEditPoints="1" noAdjustHandles="1" noChangeArrowheads="1" noChangeShapeType="1"/>
+          </p:cNvCxnSpPr>
+          <p:nvPr>
+            <p:extLst>
+              <p:ext uri="{386F3935-93C4-4BCD-93E2-E3B085C9AB24}">
+                <p16:designElem xmlns:p16="http://schemas.microsoft.com/office/powerpoint/2015/main" val="1"/>
+              </p:ext>
+            </p:extLst>
+          </p:nvPr>
+        </p:nvCxnSpPr>
+        <p:spPr>
+          <a:xfrm>
+            <a:off x="4724400" y="4109417"/>
+            <a:ext cx="2743200" cy="0"/>
+          </a:xfrm>
+          <a:prstGeom prst="line">
+            <a:avLst/>
+          </a:prstGeom>
+          <a:ln w="12700">
+            <a:solidFill>
+              <a:schemeClr val="tx1">
+                <a:lumMod val="85000"/>
+              </a:schemeClr>
+            </a:solidFill>
+          </a:ln>
+        </p:spPr>
+        <p:style>
+          <a:lnRef idx="1">
+            <a:schemeClr val="accent1"/>
+          </a:lnRef>
+          <a:fillRef idx="0">
+            <a:schemeClr val="accent1"/>
+          </a:fillRef>
+          <a:effectRef idx="0">
+            <a:schemeClr val="accent1"/>
+          </a:effectRef>
+          <a:fontRef idx="minor">
+            <a:schemeClr val="tx1"/>
+          </a:fontRef>
+        </p:style>
+      </p:cxnSp>
+    </p:spTree>
+    <p:extLst>
+      <p:ext uri="{BB962C8B-B14F-4D97-AF65-F5344CB8AC3E}">
+        <p14:creationId xmlns:p14="http://schemas.microsoft.com/office/powerpoint/2010/main" val="1839195767"/>
+      </p:ext>
+    </p:extLst>
+  </p:cSld>
+  <p:clrMapOvr>
+    <a:overrideClrMapping bg1="dk1" tx1="lt1" bg2="dk2" tx2="lt2" accent1="accent1" accent2="accent2" accent3="accent3" accent4="accent4" accent5="accent5" accent6="accent6" hlink="hlink" folHlink="folHlink"/>
+  </p:clrMapOvr>
+</p:sld>
+</file>
+
 <file path=ppt/slides/slide2.xml><?xml version="1.0" encoding="utf-8"?>
 <p:sld xmlns:a="http://schemas.openxmlformats.org/drawingml/2006/main" xmlns:r="http://schemas.openxmlformats.org/officeDocument/2006/relationships" xmlns:p="http://schemas.openxmlformats.org/presentationml/2006/main">
   <p:cSld>
@@ -11980,6 +12334,61 @@
       </p:grpSpPr>
       <p:sp>
         <p:nvSpPr>
+          <p:cNvPr id="4" name="Arrow: Pentagon 3">
+            <a:extLst>
+              <a:ext uri="{FF2B5EF4-FFF2-40B4-BE49-F238E27FC236}">
+                <a16:creationId xmlns:a16="http://schemas.microsoft.com/office/drawing/2014/main" id="{DB693FB2-2D77-4BF2-BFBF-F8CC4D1D16BE}"/>
+              </a:ext>
+            </a:extLst>
+          </p:cNvPr>
+          <p:cNvSpPr/>
+          <p:nvPr/>
+        </p:nvSpPr>
+        <p:spPr>
+          <a:xfrm>
+            <a:off x="543991" y="2886680"/>
+            <a:ext cx="2655374" cy="1084637"/>
+          </a:xfrm>
+          <a:prstGeom prst="homePlate">
+            <a:avLst/>
+          </a:prstGeom>
+          <a:solidFill>
+            <a:schemeClr val="tx1">
+              <a:lumMod val="75000"/>
+              <a:lumOff val="25000"/>
+            </a:schemeClr>
+          </a:solidFill>
+          <a:ln>
+            <a:noFill/>
+          </a:ln>
+        </p:spPr>
+        <p:style>
+          <a:lnRef idx="2">
+            <a:schemeClr val="dk1">
+              <a:shade val="50000"/>
+            </a:schemeClr>
+          </a:lnRef>
+          <a:fillRef idx="1">
+            <a:schemeClr val="dk1"/>
+          </a:fillRef>
+          <a:effectRef idx="0">
+            <a:schemeClr val="dk1"/>
+          </a:effectRef>
+          <a:fontRef idx="minor">
+            <a:schemeClr val="lt1"/>
+          </a:fontRef>
+        </p:style>
+        <p:txBody>
+          <a:bodyPr rtlCol="0" anchor="ctr"/>
+          <a:lstStyle/>
+          <a:p>
+            <a:pPr algn="ctr"/>
+            <a:endParaRPr lang="en-US"/>
+          </a:p>
+        </p:txBody>
+      </p:sp>
+      <p:sp>
+        <p:nvSpPr>
           <p:cNvPr id="2" name="Title 1">
             <a:extLst>
               <a:ext uri="{FF2B5EF4-FFF2-40B4-BE49-F238E27FC236}">
@@ -11996,7 +12405,7 @@
         </p:nvSpPr>
         <p:spPr>
           <a:xfrm>
-            <a:off x="1082040" y="2766217"/>
+            <a:off x="1002141" y="2766218"/>
             <a:ext cx="1513114" cy="1325563"/>
           </a:xfrm>
         </p:spPr>
@@ -12006,10 +12415,13 @@
           <a:p>
             <a:pPr algn="ctr"/>
             <a:r>
-              <a:rPr lang="en-US"/>
+              <a:rPr lang="en-US" dirty="0">
+                <a:solidFill>
+                  <a:schemeClr val="bg1"/>
+                </a:solidFill>
+              </a:rPr>
               <a:t>Data</a:t>
             </a:r>
-            <a:endParaRPr lang="en-US" dirty="0"/>
           </a:p>
         </p:txBody>
       </p:sp>
@@ -12948,8 +13360,8 @@
         </p:nvSpPr>
         <p:spPr>
           <a:xfrm>
-            <a:off x="712550" y="399376"/>
-            <a:ext cx="8660050" cy="1417042"/>
+            <a:off x="712550" y="304351"/>
+            <a:ext cx="4480887" cy="1417042"/>
           </a:xfrm>
           <a:prstGeom prst="homePlate">
             <a:avLst/>
@@ -13007,8 +13419,8 @@
         </p:nvSpPr>
         <p:spPr>
           <a:xfrm>
-            <a:off x="838200" y="399377"/>
-            <a:ext cx="7025640" cy="1417042"/>
+            <a:off x="838200" y="304352"/>
+            <a:ext cx="3556247" cy="1417042"/>
           </a:xfrm>
         </p:spPr>
         <p:txBody>
@@ -13021,7 +13433,7 @@
                   <a:schemeClr val="bg1"/>
                 </a:solidFill>
               </a:rPr>
-              <a:t>Sample Rows of Class Variable</a:t>
+              <a:t>Class Variable</a:t>
             </a:r>
           </a:p>
         </p:txBody>
@@ -13042,13 +13454,13 @@
             <p:ph idx="1"/>
             <p:extLst>
               <p:ext uri="{D42A27DB-BD31-4B8C-83A1-F6EECF244321}">
-                <p14:modId xmlns:p14="http://schemas.microsoft.com/office/powerpoint/2010/main" val="2639520277"/>
+                <p14:modId xmlns:p14="http://schemas.microsoft.com/office/powerpoint/2010/main" val="3705773093"/>
               </p:ext>
             </p:extLst>
           </p:nvPr>
         </p:nvGraphicFramePr>
         <p:xfrm>
-          <a:off x="838200" y="2889467"/>
+          <a:off x="838200" y="3373500"/>
           <a:ext cx="10694589" cy="3336163"/>
         </p:xfrm>
         <a:graphic>
@@ -13761,6 +14173,36 @@
           </a:graphicData>
         </a:graphic>
       </p:graphicFrame>
+      <p:pic>
+        <p:nvPicPr>
+          <p:cNvPr id="6" name="Picture 5">
+            <a:extLst>
+              <a:ext uri="{FF2B5EF4-FFF2-40B4-BE49-F238E27FC236}">
+                <a16:creationId xmlns:a16="http://schemas.microsoft.com/office/drawing/2014/main" id="{A5826D14-8F44-406D-B69F-696092A63A15}"/>
+              </a:ext>
+            </a:extLst>
+          </p:cNvPr>
+          <p:cNvPicPr>
+            <a:picLocks noChangeAspect="1"/>
+          </p:cNvPicPr>
+          <p:nvPr/>
+        </p:nvPicPr>
+        <p:blipFill>
+          <a:blip r:embed="rId2"/>
+          <a:stretch>
+            <a:fillRect/>
+          </a:stretch>
+        </p:blipFill>
+        <p:spPr>
+          <a:xfrm>
+            <a:off x="2519756" y="1851930"/>
+            <a:ext cx="7331476" cy="1367033"/>
+          </a:xfrm>
+          <a:prstGeom prst="rect">
+            <a:avLst/>
+          </a:prstGeom>
+        </p:spPr>
+      </p:pic>
     </p:spTree>
     <p:extLst>
       <p:ext uri="{BB962C8B-B14F-4D97-AF65-F5344CB8AC3E}">
@@ -13807,14 +14249,14 @@
             <p:ph idx="1"/>
             <p:extLst>
               <p:ext uri="{D42A27DB-BD31-4B8C-83A1-F6EECF244321}">
-                <p14:modId xmlns:p14="http://schemas.microsoft.com/office/powerpoint/2010/main" val="3726819226"/>
+                <p14:modId xmlns:p14="http://schemas.microsoft.com/office/powerpoint/2010/main" val="2435968942"/>
               </p:ext>
             </p:extLst>
           </p:nvPr>
         </p:nvGraphicFramePr>
         <p:xfrm>
-          <a:off x="74676" y="2698876"/>
-          <a:ext cx="12042648" cy="3401165"/>
+          <a:off x="338532" y="2654488"/>
+          <a:ext cx="11514936" cy="3401165"/>
         </p:xfrm>
         <a:graphic>
           <a:graphicData uri="http://schemas.openxmlformats.org/drawingml/2006/table">
@@ -13823,87 +14265,87 @@
                 <a:tableStyleId>{F5AB1C69-6EDB-4FF4-983F-18BD219EF322}</a:tableStyleId>
               </a:tblPr>
               <a:tblGrid>
-                <a:gridCol w="1003554">
+                <a:gridCol w="959578">
                   <a:extLst>
                     <a:ext uri="{9D8B030D-6E8A-4147-A177-3AD203B41FA5}">
                       <a16:colId xmlns:a16="http://schemas.microsoft.com/office/drawing/2014/main" val="523669202"/>
                     </a:ext>
                   </a:extLst>
                 </a:gridCol>
-                <a:gridCol w="1003554">
+                <a:gridCol w="959578">
                   <a:extLst>
                     <a:ext uri="{9D8B030D-6E8A-4147-A177-3AD203B41FA5}">
                       <a16:colId xmlns:a16="http://schemas.microsoft.com/office/drawing/2014/main" val="975967824"/>
                     </a:ext>
                   </a:extLst>
                 </a:gridCol>
-                <a:gridCol w="1003554">
+                <a:gridCol w="959578">
                   <a:extLst>
                     <a:ext uri="{9D8B030D-6E8A-4147-A177-3AD203B41FA5}">
                       <a16:colId xmlns:a16="http://schemas.microsoft.com/office/drawing/2014/main" val="1263643241"/>
                     </a:ext>
                   </a:extLst>
                 </a:gridCol>
-                <a:gridCol w="1003554">
+                <a:gridCol w="959578">
                   <a:extLst>
                     <a:ext uri="{9D8B030D-6E8A-4147-A177-3AD203B41FA5}">
                       <a16:colId xmlns:a16="http://schemas.microsoft.com/office/drawing/2014/main" val="3430801892"/>
                     </a:ext>
                   </a:extLst>
                 </a:gridCol>
-                <a:gridCol w="1003554">
+                <a:gridCol w="959578">
                   <a:extLst>
                     <a:ext uri="{9D8B030D-6E8A-4147-A177-3AD203B41FA5}">
                       <a16:colId xmlns:a16="http://schemas.microsoft.com/office/drawing/2014/main" val="416089458"/>
                     </a:ext>
                   </a:extLst>
                 </a:gridCol>
-                <a:gridCol w="1003554">
+                <a:gridCol w="959578">
                   <a:extLst>
                     <a:ext uri="{9D8B030D-6E8A-4147-A177-3AD203B41FA5}">
                       <a16:colId xmlns:a16="http://schemas.microsoft.com/office/drawing/2014/main" val="177072767"/>
                     </a:ext>
                   </a:extLst>
                 </a:gridCol>
-                <a:gridCol w="1003554">
+                <a:gridCol w="959578">
+                  <a:extLst>
+                    <a:ext uri="{9D8B030D-6E8A-4147-A177-3AD203B41FA5}">
+                      <a16:colId xmlns:a16="http://schemas.microsoft.com/office/drawing/2014/main" val="2388307979"/>
+                    </a:ext>
+                  </a:extLst>
+                </a:gridCol>
+                <a:gridCol w="959578">
                   <a:extLst>
                     <a:ext uri="{9D8B030D-6E8A-4147-A177-3AD203B41FA5}">
                       <a16:colId xmlns:a16="http://schemas.microsoft.com/office/drawing/2014/main" val="2458322973"/>
                     </a:ext>
                   </a:extLst>
                 </a:gridCol>
-                <a:gridCol w="1003554">
+                <a:gridCol w="959578">
                   <a:extLst>
                     <a:ext uri="{9D8B030D-6E8A-4147-A177-3AD203B41FA5}">
                       <a16:colId xmlns:a16="http://schemas.microsoft.com/office/drawing/2014/main" val="336383087"/>
                     </a:ext>
                   </a:extLst>
                 </a:gridCol>
-                <a:gridCol w="1003554">
+                <a:gridCol w="959578">
                   <a:extLst>
                     <a:ext uri="{9D8B030D-6E8A-4147-A177-3AD203B41FA5}">
                       <a16:colId xmlns:a16="http://schemas.microsoft.com/office/drawing/2014/main" val="1704848317"/>
                     </a:ext>
                   </a:extLst>
                 </a:gridCol>
-                <a:gridCol w="1003554">
+                <a:gridCol w="959578">
                   <a:extLst>
                     <a:ext uri="{9D8B030D-6E8A-4147-A177-3AD203B41FA5}">
                       <a16:colId xmlns:a16="http://schemas.microsoft.com/office/drawing/2014/main" val="2416237266"/>
                     </a:ext>
                   </a:extLst>
                 </a:gridCol>
-                <a:gridCol w="1003554">
+                <a:gridCol w="959578">
                   <a:extLst>
                     <a:ext uri="{9D8B030D-6E8A-4147-A177-3AD203B41FA5}">
                       <a16:colId xmlns:a16="http://schemas.microsoft.com/office/drawing/2014/main" val="3173392808"/>
-                    </a:ext>
-                  </a:extLst>
-                </a:gridCol>
-                <a:gridCol w="1003554">
-                  <a:extLst>
-                    <a:ext uri="{9D8B030D-6E8A-4147-A177-3AD203B41FA5}">
-                      <a16:colId xmlns:a16="http://schemas.microsoft.com/office/drawing/2014/main" val="3530777207"/>
                     </a:ext>
                   </a:extLst>
                 </a:gridCol>
@@ -14042,10 +14484,30 @@
                     <a:p>
                       <a:pPr algn="ctr"/>
                       <a:r>
-                        <a:rPr lang="en-US" sz="1600"/>
+                        <a:rPr lang="en-US" sz="1600" dirty="0"/>
+                        <a:t>Poverty Rate</a:t>
+                      </a:r>
+                    </a:p>
+                  </a:txBody>
+                  <a:tcPr anchor="ctr">
+                    <a:solidFill>
+                      <a:schemeClr val="tx1">
+                        <a:lumMod val="65000"/>
+                        <a:lumOff val="35000"/>
+                      </a:schemeClr>
+                    </a:solidFill>
+                  </a:tcPr>
+                </a:tc>
+                <a:tc>
+                  <a:txBody>
+                    <a:bodyPr/>
+                    <a:lstStyle/>
+                    <a:p>
+                      <a:pPr algn="ctr"/>
+                      <a:r>
+                        <a:rPr lang="en-US" sz="1600" dirty="0"/>
                         <a:t>Hispanic</a:t>
                       </a:r>
-                      <a:endParaRPr lang="en-US" sz="1600" dirty="0"/>
                     </a:p>
                   </a:txBody>
                   <a:tcPr anchor="ctr">
@@ -14129,27 +14591,6 @@
                       <a:r>
                         <a:rPr lang="en-US" sz="1600" dirty="0"/>
                         <a:t>Other</a:t>
-                      </a:r>
-                    </a:p>
-                  </a:txBody>
-                  <a:tcPr anchor="ctr">
-                    <a:solidFill>
-                      <a:schemeClr val="tx1">
-                        <a:lumMod val="65000"/>
-                        <a:lumOff val="35000"/>
-                      </a:schemeClr>
-                    </a:solidFill>
-                  </a:tcPr>
-                </a:tc>
-                <a:tc>
-                  <a:txBody>
-                    <a:bodyPr/>
-                    <a:lstStyle/>
-                    <a:p>
-                      <a:pPr algn="ctr"/>
-                      <a:r>
-                        <a:rPr lang="en-US" sz="1600" dirty="0"/>
-                        <a:t>Poverty Rate</a:t>
                       </a:r>
                     </a:p>
                   </a:txBody>
@@ -14414,6 +14855,44 @@
                         </a:spcAft>
                       </a:pPr>
                       <a:r>
+                        <a:rPr lang="en-CA" sz="1400" dirty="0">
+                          <a:solidFill>
+                            <a:srgbClr val="000000"/>
+                          </a:solidFill>
+                          <a:effectLst/>
+                          <a:latin typeface="Calibri (Body)"/>
+                          <a:ea typeface="MS Mincho" panose="02020609040205080304" pitchFamily="49" charset="-128"/>
+                          <a:cs typeface="Times New Roman" panose="02020603050405020304" pitchFamily="18" charset="0"/>
+                        </a:rPr>
+                        <a:t>0.24</a:t>
+                      </a:r>
+                      <a:endParaRPr lang="en-US" sz="1400" dirty="0">
+                        <a:effectLst/>
+                        <a:latin typeface="Calibri (Body)"/>
+                        <a:ea typeface="MS Mincho" panose="02020609040205080304" pitchFamily="49" charset="-128"/>
+                        <a:cs typeface="Times New Roman" panose="02020603050405020304" pitchFamily="18" charset="0"/>
+                      </a:endParaRPr>
+                    </a:p>
+                  </a:txBody>
+                  <a:tcPr marL="68580" marR="68580" marT="0" marB="0" anchor="ctr"/>
+                </a:tc>
+                <a:tc>
+                  <a:txBody>
+                    <a:bodyPr/>
+                    <a:lstStyle/>
+                    <a:p>
+                      <a:pPr marL="0" marR="0" algn="ctr">
+                        <a:lnSpc>
+                          <a:spcPct val="200000"/>
+                        </a:lnSpc>
+                        <a:spcBef>
+                          <a:spcPts val="0"/>
+                        </a:spcBef>
+                        <a:spcAft>
+                          <a:spcPts val="0"/>
+                        </a:spcAft>
+                      </a:pPr>
+                      <a:r>
                         <a:rPr lang="en-CA" sz="1400">
                           <a:solidFill>
                             <a:srgbClr val="000000"/>
@@ -14576,44 +15055,6 @@
                           <a:cs typeface="Times New Roman" panose="02020603050405020304" pitchFamily="18" charset="0"/>
                         </a:rPr>
                         <a:t>0.319509</a:t>
-                      </a:r>
-                      <a:endParaRPr lang="en-US" sz="1400">
-                        <a:effectLst/>
-                        <a:latin typeface="Calibri (Body)"/>
-                        <a:ea typeface="MS Mincho" panose="02020609040205080304" pitchFamily="49" charset="-128"/>
-                        <a:cs typeface="Times New Roman" panose="02020603050405020304" pitchFamily="18" charset="0"/>
-                      </a:endParaRPr>
-                    </a:p>
-                  </a:txBody>
-                  <a:tcPr marL="68580" marR="68580" marT="0" marB="0" anchor="ctr"/>
-                </a:tc>
-                <a:tc>
-                  <a:txBody>
-                    <a:bodyPr/>
-                    <a:lstStyle/>
-                    <a:p>
-                      <a:pPr marL="0" marR="0" algn="ctr">
-                        <a:lnSpc>
-                          <a:spcPct val="200000"/>
-                        </a:lnSpc>
-                        <a:spcBef>
-                          <a:spcPts val="0"/>
-                        </a:spcBef>
-                        <a:spcAft>
-                          <a:spcPts val="0"/>
-                        </a:spcAft>
-                      </a:pPr>
-                      <a:r>
-                        <a:rPr lang="en-CA" sz="1400">
-                          <a:solidFill>
-                            <a:srgbClr val="000000"/>
-                          </a:solidFill>
-                          <a:effectLst/>
-                          <a:latin typeface="Calibri (Body)"/>
-                          <a:ea typeface="MS Mincho" panose="02020609040205080304" pitchFamily="49" charset="-128"/>
-                          <a:cs typeface="Times New Roman" panose="02020603050405020304" pitchFamily="18" charset="0"/>
-                        </a:rPr>
-                        <a:t>0.24</a:t>
                       </a:r>
                       <a:endParaRPr lang="en-US" sz="1400">
                         <a:effectLst/>
@@ -14886,6 +15327,44 @@
                           <a:ea typeface="MS Mincho" panose="02020609040205080304" pitchFamily="49" charset="-128"/>
                           <a:cs typeface="Times New Roman" panose="02020603050405020304" pitchFamily="18" charset="0"/>
                         </a:rPr>
+                        <a:t>0.2</a:t>
+                      </a:r>
+                      <a:endParaRPr lang="en-US" sz="1400" dirty="0">
+                        <a:effectLst/>
+                        <a:latin typeface="Calibri (Body)"/>
+                        <a:ea typeface="MS Mincho" panose="02020609040205080304" pitchFamily="49" charset="-128"/>
+                        <a:cs typeface="Times New Roman" panose="02020603050405020304" pitchFamily="18" charset="0"/>
+                      </a:endParaRPr>
+                    </a:p>
+                  </a:txBody>
+                  <a:tcPr marL="68580" marR="68580" marT="0" marB="0" anchor="ctr"/>
+                </a:tc>
+                <a:tc>
+                  <a:txBody>
+                    <a:bodyPr/>
+                    <a:lstStyle/>
+                    <a:p>
+                      <a:pPr marL="0" marR="0" algn="ctr">
+                        <a:lnSpc>
+                          <a:spcPct val="200000"/>
+                        </a:lnSpc>
+                        <a:spcBef>
+                          <a:spcPts val="0"/>
+                        </a:spcBef>
+                        <a:spcAft>
+                          <a:spcPts val="0"/>
+                        </a:spcAft>
+                      </a:pPr>
+                      <a:r>
+                        <a:rPr lang="en-CA" sz="1400" dirty="0">
+                          <a:solidFill>
+                            <a:srgbClr val="000000"/>
+                          </a:solidFill>
+                          <a:effectLst/>
+                          <a:latin typeface="Calibri (Body)"/>
+                          <a:ea typeface="MS Mincho" panose="02020609040205080304" pitchFamily="49" charset="-128"/>
+                          <a:cs typeface="Times New Roman" panose="02020603050405020304" pitchFamily="18" charset="0"/>
+                        </a:rPr>
                         <a:t>0.13</a:t>
                       </a:r>
                       <a:endParaRPr lang="en-US" sz="1400" dirty="0">
@@ -15039,44 +15518,6 @@
                           <a:cs typeface="Times New Roman" panose="02020603050405020304" pitchFamily="18" charset="0"/>
                         </a:rPr>
                         <a:t>0.372624</a:t>
-                      </a:r>
-                      <a:endParaRPr lang="en-US" sz="1400">
-                        <a:effectLst/>
-                        <a:latin typeface="Calibri (Body)"/>
-                        <a:ea typeface="MS Mincho" panose="02020609040205080304" pitchFamily="49" charset="-128"/>
-                        <a:cs typeface="Times New Roman" panose="02020603050405020304" pitchFamily="18" charset="0"/>
-                      </a:endParaRPr>
-                    </a:p>
-                  </a:txBody>
-                  <a:tcPr marL="68580" marR="68580" marT="0" marB="0" anchor="ctr"/>
-                </a:tc>
-                <a:tc>
-                  <a:txBody>
-                    <a:bodyPr/>
-                    <a:lstStyle/>
-                    <a:p>
-                      <a:pPr marL="0" marR="0" algn="ctr">
-                        <a:lnSpc>
-                          <a:spcPct val="200000"/>
-                        </a:lnSpc>
-                        <a:spcBef>
-                          <a:spcPts val="0"/>
-                        </a:spcBef>
-                        <a:spcAft>
-                          <a:spcPts val="0"/>
-                        </a:spcAft>
-                      </a:pPr>
-                      <a:r>
-                        <a:rPr lang="en-CA" sz="1400">
-                          <a:solidFill>
-                            <a:srgbClr val="000000"/>
-                          </a:solidFill>
-                          <a:effectLst/>
-                          <a:latin typeface="Calibri (Body)"/>
-                          <a:ea typeface="MS Mincho" panose="02020609040205080304" pitchFamily="49" charset="-128"/>
-                          <a:cs typeface="Times New Roman" panose="02020603050405020304" pitchFamily="18" charset="0"/>
-                        </a:rPr>
-                        <a:t>0.2</a:t>
                       </a:r>
                       <a:endParaRPr lang="en-US" sz="1400">
                         <a:effectLst/>
@@ -15340,6 +15781,44 @@
                         </a:spcAft>
                       </a:pPr>
                       <a:r>
+                        <a:rPr lang="en-CA" sz="1400" dirty="0">
+                          <a:solidFill>
+                            <a:srgbClr val="000000"/>
+                          </a:solidFill>
+                          <a:effectLst/>
+                          <a:latin typeface="Calibri (Body)"/>
+                          <a:ea typeface="MS Mincho" panose="02020609040205080304" pitchFamily="49" charset="-128"/>
+                          <a:cs typeface="Times New Roman" panose="02020603050405020304" pitchFamily="18" charset="0"/>
+                        </a:rPr>
+                        <a:t>0.16</a:t>
+                      </a:r>
+                      <a:endParaRPr lang="en-US" sz="1400" dirty="0">
+                        <a:effectLst/>
+                        <a:latin typeface="Calibri (Body)"/>
+                        <a:ea typeface="MS Mincho" panose="02020609040205080304" pitchFamily="49" charset="-128"/>
+                        <a:cs typeface="Times New Roman" panose="02020603050405020304" pitchFamily="18" charset="0"/>
+                      </a:endParaRPr>
+                    </a:p>
+                  </a:txBody>
+                  <a:tcPr marL="68580" marR="68580" marT="0" marB="0" anchor="ctr"/>
+                </a:tc>
+                <a:tc>
+                  <a:txBody>
+                    <a:bodyPr/>
+                    <a:lstStyle/>
+                    <a:p>
+                      <a:pPr marL="0" marR="0" algn="ctr">
+                        <a:lnSpc>
+                          <a:spcPct val="200000"/>
+                        </a:lnSpc>
+                        <a:spcBef>
+                          <a:spcPts val="0"/>
+                        </a:spcBef>
+                        <a:spcAft>
+                          <a:spcPts val="0"/>
+                        </a:spcAft>
+                      </a:pPr>
+                      <a:r>
                         <a:rPr lang="en-CA" sz="1400">
                           <a:solidFill>
                             <a:srgbClr val="000000"/>
@@ -15502,44 +15981,6 @@
                           <a:cs typeface="Times New Roman" panose="02020603050405020304" pitchFamily="18" charset="0"/>
                         </a:rPr>
                         <a:t>0.278424</a:t>
-                      </a:r>
-                      <a:endParaRPr lang="en-US" sz="1400">
-                        <a:effectLst/>
-                        <a:latin typeface="Calibri (Body)"/>
-                        <a:ea typeface="MS Mincho" panose="02020609040205080304" pitchFamily="49" charset="-128"/>
-                        <a:cs typeface="Times New Roman" panose="02020603050405020304" pitchFamily="18" charset="0"/>
-                      </a:endParaRPr>
-                    </a:p>
-                  </a:txBody>
-                  <a:tcPr marL="68580" marR="68580" marT="0" marB="0" anchor="ctr"/>
-                </a:tc>
-                <a:tc>
-                  <a:txBody>
-                    <a:bodyPr/>
-                    <a:lstStyle/>
-                    <a:p>
-                      <a:pPr marL="0" marR="0" algn="ctr">
-                        <a:lnSpc>
-                          <a:spcPct val="200000"/>
-                        </a:lnSpc>
-                        <a:spcBef>
-                          <a:spcPts val="0"/>
-                        </a:spcBef>
-                        <a:spcAft>
-                          <a:spcPts val="0"/>
-                        </a:spcAft>
-                      </a:pPr>
-                      <a:r>
-                        <a:rPr lang="en-CA" sz="1400">
-                          <a:solidFill>
-                            <a:srgbClr val="000000"/>
-                          </a:solidFill>
-                          <a:effectLst/>
-                          <a:latin typeface="Calibri (Body)"/>
-                          <a:ea typeface="MS Mincho" panose="02020609040205080304" pitchFamily="49" charset="-128"/>
-                          <a:cs typeface="Times New Roman" panose="02020603050405020304" pitchFamily="18" charset="0"/>
-                        </a:rPr>
-                        <a:t>0.16</a:t>
                       </a:r>
                       <a:endParaRPr lang="en-US" sz="1400">
                         <a:effectLst/>
@@ -15803,6 +16244,44 @@
                         </a:spcAft>
                       </a:pPr>
                       <a:r>
+                        <a:rPr lang="en-CA" sz="1400" dirty="0">
+                          <a:solidFill>
+                            <a:srgbClr val="000000"/>
+                          </a:solidFill>
+                          <a:effectLst/>
+                          <a:latin typeface="Calibri (Body)"/>
+                          <a:ea typeface="MS Mincho" panose="02020609040205080304" pitchFamily="49" charset="-128"/>
+                          <a:cs typeface="Times New Roman" panose="02020603050405020304" pitchFamily="18" charset="0"/>
+                        </a:rPr>
+                        <a:t>0.18</a:t>
+                      </a:r>
+                      <a:endParaRPr lang="en-US" sz="1400" dirty="0">
+                        <a:effectLst/>
+                        <a:latin typeface="Calibri (Body)"/>
+                        <a:ea typeface="MS Mincho" panose="02020609040205080304" pitchFamily="49" charset="-128"/>
+                        <a:cs typeface="Times New Roman" panose="02020603050405020304" pitchFamily="18" charset="0"/>
+                      </a:endParaRPr>
+                    </a:p>
+                  </a:txBody>
+                  <a:tcPr marL="68580" marR="68580" marT="0" marB="0" anchor="ctr"/>
+                </a:tc>
+                <a:tc>
+                  <a:txBody>
+                    <a:bodyPr/>
+                    <a:lstStyle/>
+                    <a:p>
+                      <a:pPr marL="0" marR="0" algn="ctr">
+                        <a:lnSpc>
+                          <a:spcPct val="200000"/>
+                        </a:lnSpc>
+                        <a:spcBef>
+                          <a:spcPts val="0"/>
+                        </a:spcBef>
+                        <a:spcAft>
+                          <a:spcPts val="0"/>
+                        </a:spcAft>
+                      </a:pPr>
+                      <a:r>
                         <a:rPr lang="en-CA" sz="1400">
                           <a:solidFill>
                             <a:srgbClr val="000000"/>
@@ -15967,44 +16446,6 @@
                         <a:t>0.168878</a:t>
                       </a:r>
                       <a:endParaRPr lang="en-US" sz="1400">
-                        <a:effectLst/>
-                        <a:latin typeface="Calibri (Body)"/>
-                        <a:ea typeface="MS Mincho" panose="02020609040205080304" pitchFamily="49" charset="-128"/>
-                        <a:cs typeface="Times New Roman" panose="02020603050405020304" pitchFamily="18" charset="0"/>
-                      </a:endParaRPr>
-                    </a:p>
-                  </a:txBody>
-                  <a:tcPr marL="68580" marR="68580" marT="0" marB="0" anchor="ctr"/>
-                </a:tc>
-                <a:tc>
-                  <a:txBody>
-                    <a:bodyPr/>
-                    <a:lstStyle/>
-                    <a:p>
-                      <a:pPr marL="0" marR="0" algn="ctr">
-                        <a:lnSpc>
-                          <a:spcPct val="200000"/>
-                        </a:lnSpc>
-                        <a:spcBef>
-                          <a:spcPts val="0"/>
-                        </a:spcBef>
-                        <a:spcAft>
-                          <a:spcPts val="0"/>
-                        </a:spcAft>
-                      </a:pPr>
-                      <a:r>
-                        <a:rPr lang="en-CA" sz="1400" dirty="0">
-                          <a:solidFill>
-                            <a:srgbClr val="000000"/>
-                          </a:solidFill>
-                          <a:effectLst/>
-                          <a:latin typeface="Calibri (Body)"/>
-                          <a:ea typeface="MS Mincho" panose="02020609040205080304" pitchFamily="49" charset="-128"/>
-                          <a:cs typeface="Times New Roman" panose="02020603050405020304" pitchFamily="18" charset="0"/>
-                        </a:rPr>
-                        <a:t>0.18</a:t>
-                      </a:r>
-                      <a:endParaRPr lang="en-US" sz="1400" dirty="0">
                         <a:effectLst/>
                         <a:latin typeface="Calibri (Body)"/>
                         <a:ea typeface="MS Mincho" panose="02020609040205080304" pitchFamily="49" charset="-128"/>
@@ -16266,6 +16707,44 @@
                         </a:spcAft>
                       </a:pPr>
                       <a:r>
+                        <a:rPr lang="en-CA" sz="1400" dirty="0">
+                          <a:solidFill>
+                            <a:srgbClr val="000000"/>
+                          </a:solidFill>
+                          <a:effectLst/>
+                          <a:latin typeface="Calibri (Body)"/>
+                          <a:ea typeface="MS Mincho" panose="02020609040205080304" pitchFamily="49" charset="-128"/>
+                          <a:cs typeface="Times New Roman" panose="02020603050405020304" pitchFamily="18" charset="0"/>
+                        </a:rPr>
+                        <a:t>0.11</a:t>
+                      </a:r>
+                      <a:endParaRPr lang="en-US" sz="1400" dirty="0">
+                        <a:effectLst/>
+                        <a:latin typeface="Calibri (Body)"/>
+                        <a:ea typeface="MS Mincho" panose="02020609040205080304" pitchFamily="49" charset="-128"/>
+                        <a:cs typeface="Times New Roman" panose="02020603050405020304" pitchFamily="18" charset="0"/>
+                      </a:endParaRPr>
+                    </a:p>
+                  </a:txBody>
+                  <a:tcPr marL="68580" marR="68580" marT="0" marB="0" anchor="ctr"/>
+                </a:tc>
+                <a:tc>
+                  <a:txBody>
+                    <a:bodyPr/>
+                    <a:lstStyle/>
+                    <a:p>
+                      <a:pPr marL="0" marR="0" algn="ctr">
+                        <a:lnSpc>
+                          <a:spcPct val="200000"/>
+                        </a:lnSpc>
+                        <a:spcBef>
+                          <a:spcPts val="0"/>
+                        </a:spcBef>
+                        <a:spcAft>
+                          <a:spcPts val="0"/>
+                        </a:spcAft>
+                      </a:pPr>
+                      <a:r>
                         <a:rPr lang="en-CA" sz="1400">
                           <a:solidFill>
                             <a:srgbClr val="000000"/>
@@ -16418,7 +16897,7 @@
                         </a:spcAft>
                       </a:pPr>
                       <a:r>
-                        <a:rPr lang="en-CA" sz="1400">
+                        <a:rPr lang="en-CA" sz="1400" dirty="0">
                           <a:solidFill>
                             <a:srgbClr val="000000"/>
                           </a:solidFill>
@@ -16428,44 +16907,6 @@
                           <a:cs typeface="Times New Roman" panose="02020603050405020304" pitchFamily="18" charset="0"/>
                         </a:rPr>
                         <a:t>0.058669</a:t>
-                      </a:r>
-                      <a:endParaRPr lang="en-US" sz="1400">
-                        <a:effectLst/>
-                        <a:latin typeface="Calibri (Body)"/>
-                        <a:ea typeface="MS Mincho" panose="02020609040205080304" pitchFamily="49" charset="-128"/>
-                        <a:cs typeface="Times New Roman" panose="02020603050405020304" pitchFamily="18" charset="0"/>
-                      </a:endParaRPr>
-                    </a:p>
-                  </a:txBody>
-                  <a:tcPr marL="68580" marR="68580" marT="0" marB="0" anchor="ctr"/>
-                </a:tc>
-                <a:tc>
-                  <a:txBody>
-                    <a:bodyPr/>
-                    <a:lstStyle/>
-                    <a:p>
-                      <a:pPr marL="0" marR="0" algn="ctr">
-                        <a:lnSpc>
-                          <a:spcPct val="200000"/>
-                        </a:lnSpc>
-                        <a:spcBef>
-                          <a:spcPts val="0"/>
-                        </a:spcBef>
-                        <a:spcAft>
-                          <a:spcPts val="0"/>
-                        </a:spcAft>
-                      </a:pPr>
-                      <a:r>
-                        <a:rPr lang="en-CA" sz="1400" dirty="0">
-                          <a:solidFill>
-                            <a:srgbClr val="000000"/>
-                          </a:solidFill>
-                          <a:effectLst/>
-                          <a:latin typeface="Calibri (Body)"/>
-                          <a:ea typeface="MS Mincho" panose="02020609040205080304" pitchFamily="49" charset="-128"/>
-                          <a:cs typeface="Times New Roman" panose="02020603050405020304" pitchFamily="18" charset="0"/>
-                        </a:rPr>
-                        <a:t>0.11</a:t>
                       </a:r>
                       <a:endParaRPr lang="en-US" sz="1400" dirty="0">
                         <a:effectLst/>
@@ -16501,8 +16942,8 @@
         </p:nvSpPr>
         <p:spPr>
           <a:xfrm>
-            <a:off x="712550" y="399376"/>
-            <a:ext cx="8660050" cy="1417042"/>
+            <a:off x="703673" y="443765"/>
+            <a:ext cx="3575365" cy="1417042"/>
           </a:xfrm>
           <a:prstGeom prst="homePlate">
             <a:avLst/>
@@ -16558,8 +16999,8 @@
         </p:nvSpPr>
         <p:spPr>
           <a:xfrm>
-            <a:off x="838200" y="399377"/>
-            <a:ext cx="7025640" cy="1417042"/>
+            <a:off x="829323" y="443766"/>
+            <a:ext cx="2624091" cy="1417042"/>
           </a:xfrm>
           <a:prstGeom prst="rect">
             <a:avLst/>
@@ -16595,7 +17036,7 @@
                   <a:schemeClr val="bg1"/>
                 </a:solidFill>
               </a:rPr>
-              <a:t>Sample Rows of Predictors</a:t>
+              <a:t>Predictors</a:t>
             </a:r>
           </a:p>
         </p:txBody>

</xml_diff>